<commit_message>
v4 -  final updated.
</commit_message>
<xml_diff>
--- a/articles/solution-engineering-natd/FY20_Candidate_Cloud_Presentation.pptx
+++ b/articles/solution-engineering-natd/FY20_Candidate_Cloud_Presentation.pptx
@@ -1066,7 +1066,15 @@
           <a:p>
             <a:r>
               <a:rPr lang="en-US" dirty="0"/>
-              <a:t>Fundamental cloud service that a lot of cloud vendors  </a:t>
+              <a:t>Fundamental cloud service that </a:t>
+            </a:r>
+            <a:r>
+              <a:rPr lang="en-US"/>
+              <a:t>combines best-in-class networking</a:t>
+            </a:r>
+            <a:r>
+              <a:rPr lang="en-US" dirty="0"/>
+              <a:t>, compute and storage</a:t>
             </a:r>
           </a:p>
         </p:txBody>
@@ -2259,7 +2267,7 @@
                   <a:schemeClr val="tx1"/>
                 </a:solidFill>
               </a:rPr>
-              <a:t>2017,</a:t>
+              <a:t>2018,</a:t>
             </a:r>
             <a:r>
               <a:rPr sz="638" dirty="0">
@@ -2475,7 +2483,7 @@
             <a:fld id="{12C55C7B-5E5C-D447-9BFF-07422F49C101}" type="datetime1">
               <a:rPr lang="mr-IN" smtClean="0"/>
               <a:pPr/>
-              <a:t>15-10-2018</a:t>
+              <a:t>22-10-2018</a:t>
             </a:fld>
             <a:endParaRPr lang="mr-IN" dirty="0"/>
           </a:p>
@@ -2806,7 +2814,7 @@
                   <a:schemeClr val="bg1"/>
                 </a:solidFill>
               </a:rPr>
-              <a:t>Copyright © 2017, Oracle and/or its affiliates. All rights reserved.  |</a:t>
+              <a:t>Copyright © 2018, Oracle and/or its affiliates. All rights reserved.  </a:t>
             </a:r>
           </a:p>
         </p:txBody>
@@ -3260,7 +3268,7 @@
             <a:fld id="{07B1C83C-F076-8647-B801-E4E22196B57D}" type="datetime1">
               <a:rPr lang="en-US"/>
               <a:pPr/>
-              <a:t>10/15/2018</a:t>
+              <a:t>10/22/2018</a:t>
             </a:fld>
             <a:endParaRPr/>
           </a:p>
@@ -3358,7 +3366,7 @@
                   <a:srgbClr val="58595B"/>
                 </a:solidFill>
               </a:rPr>
-              <a:t>Copyright © 2017, Oracle and/or its affiliates. All rights reserved.  |</a:t>
+              <a:t>Copyright © 2018, Oracle and/or its affiliates. All rights reserved.  |</a:t>
             </a:r>
           </a:p>
         </p:txBody>
@@ -4077,7 +4085,7 @@
                   <a:schemeClr val="tx1"/>
                 </a:solidFill>
               </a:rPr>
-              <a:t>2017,</a:t>
+              <a:t>2018,</a:t>
             </a:r>
             <a:r>
               <a:rPr sz="638" dirty="0">
@@ -4179,7 +4187,7 @@
                 </a:solidFill>
               </a:rPr>
               <a:pPr/>
-              <a:t>10/15/2018</a:t>
+              <a:t>10/22/2018</a:t>
             </a:fld>
             <a:endParaRPr dirty="0">
               <a:solidFill>
@@ -5045,7 +5053,7 @@
                   </a:schemeClr>
                 </a:solidFill>
               </a:rPr>
-              <a:t>2017</a:t>
+              <a:t>2018</a:t>
             </a:r>
             <a:r>
               <a:rPr lang="en-US" sz="700" baseline="0" dirty="0">
@@ -5788,17 +5796,17 @@
           </a:ln>
           <a:extLst>
             <a:ext uri="{FAA26D3D-D897-4be2-8F04-BA451C77F1D7}">
-              <ma14:placeholderFlag xmlns="" xmlns:ma14="http://schemas.microsoft.com/office/mac/drawingml/2011/main" val="1"/>
+              <ma14:placeholderFlag xmlns:ma14="http://schemas.microsoft.com/office/mac/drawingml/2011/main" xmlns="" val="1"/>
             </a:ext>
             <a:ext uri="{909E8E84-426E-40dd-AFC4-6F175D3DCCD1}">
-              <a14:hiddenFill xmlns="" xmlns:a14="http://schemas.microsoft.com/office/drawing/2010/main">
+              <a14:hiddenFill xmlns:a14="http://schemas.microsoft.com/office/drawing/2010/main" xmlns="">
                 <a:solidFill>
                   <a:srgbClr val="FFFFFF"/>
                 </a:solidFill>
               </a14:hiddenFill>
             </a:ext>
             <a:ext uri="{91240B29-F687-4f45-9708-019B960494DF}">
-              <a14:hiddenLine xmlns="" xmlns:a14="http://schemas.microsoft.com/office/drawing/2010/main" w="9525">
+              <a14:hiddenLine xmlns:a14="http://schemas.microsoft.com/office/drawing/2010/main" xmlns="" w="9525">
                 <a:solidFill>
                   <a:srgbClr val="000000"/>
                 </a:solidFill>
@@ -5849,17 +5857,17 @@
           </a:ln>
           <a:extLst>
             <a:ext uri="{FAA26D3D-D897-4be2-8F04-BA451C77F1D7}">
-              <ma14:placeholderFlag xmlns="" xmlns:ma14="http://schemas.microsoft.com/office/mac/drawingml/2011/main" val="1"/>
+              <ma14:placeholderFlag xmlns:ma14="http://schemas.microsoft.com/office/mac/drawingml/2011/main" xmlns="" val="1"/>
             </a:ext>
             <a:ext uri="{909E8E84-426E-40dd-AFC4-6F175D3DCCD1}">
-              <a14:hiddenFill xmlns="" xmlns:a14="http://schemas.microsoft.com/office/drawing/2010/main">
+              <a14:hiddenFill xmlns:a14="http://schemas.microsoft.com/office/drawing/2010/main" xmlns="">
                 <a:solidFill>
                   <a:srgbClr val="FFFFFF"/>
                 </a:solidFill>
               </a14:hiddenFill>
             </a:ext>
             <a:ext uri="{91240B29-F687-4f45-9708-019B960494DF}">
-              <a14:hiddenLine xmlns="" xmlns:a14="http://schemas.microsoft.com/office/drawing/2010/main" w="9525">
+              <a14:hiddenLine xmlns:a14="http://schemas.microsoft.com/office/drawing/2010/main" xmlns="" w="9525">
                 <a:solidFill>
                   <a:srgbClr val="000000"/>
                 </a:solidFill>
@@ -6065,7 +6073,7 @@
                 </a:solidFill>
                 <a:latin typeface="Calibri" charset="0"/>
               </a:rPr>
-              <a:t>Copyright © 2017 Oracle and/or its affiliates. All rights reserved.  | Oracle Confidential.  Internal Use Only.</a:t>
+              <a:t>Copyright © 2018 Oracle and/or its affiliates. All rights reserved.  | Oracle Confidential.  Internal Use Only.</a:t>
             </a:r>
           </a:p>
         </p:txBody>
@@ -6915,14 +6923,14 @@
           </a:ln>
           <a:extLst>
             <a:ext uri="{909E8E84-426E-40dd-AFC4-6F175D3DCCD1}">
-              <a14:hiddenFill xmlns="" xmlns:a14="http://schemas.microsoft.com/office/drawing/2010/main">
+              <a14:hiddenFill xmlns:a14="http://schemas.microsoft.com/office/drawing/2010/main" xmlns="">
                 <a:solidFill>
                   <a:srgbClr val="FFFFFF"/>
                 </a:solidFill>
               </a14:hiddenFill>
             </a:ext>
             <a:ext uri="{91240B29-F687-4f45-9708-019B960494DF}">
-              <a14:hiddenLine xmlns="" xmlns:a14="http://schemas.microsoft.com/office/drawing/2010/main" w="9525">
+              <a14:hiddenLine xmlns:a14="http://schemas.microsoft.com/office/drawing/2010/main" xmlns="" w="9525">
                 <a:solidFill>
                   <a:srgbClr val="000000"/>
                 </a:solidFill>
@@ -6958,17 +6966,17 @@
           </a:ln>
           <a:extLst>
             <a:ext uri="{FAA26D3D-D897-4be2-8F04-BA451C77F1D7}">
-              <ma14:placeholderFlag xmlns="" xmlns:ma14="http://schemas.microsoft.com/office/mac/drawingml/2011/main" val="1"/>
+              <ma14:placeholderFlag xmlns:ma14="http://schemas.microsoft.com/office/mac/drawingml/2011/main" xmlns="" val="1"/>
             </a:ext>
             <a:ext uri="{909E8E84-426E-40dd-AFC4-6F175D3DCCD1}">
-              <a14:hiddenFill xmlns="" xmlns:a14="http://schemas.microsoft.com/office/drawing/2010/main">
+              <a14:hiddenFill xmlns:a14="http://schemas.microsoft.com/office/drawing/2010/main" xmlns="">
                 <a:solidFill>
                   <a:srgbClr val="FFFFFF"/>
                 </a:solidFill>
               </a14:hiddenFill>
             </a:ext>
             <a:ext uri="{91240B29-F687-4f45-9708-019B960494DF}">
-              <a14:hiddenLine xmlns="" xmlns:a14="http://schemas.microsoft.com/office/drawing/2010/main" w="9525">
+              <a14:hiddenLine xmlns:a14="http://schemas.microsoft.com/office/drawing/2010/main" xmlns="" w="9525">
                 <a:solidFill>
                   <a:srgbClr val="000000"/>
                 </a:solidFill>
@@ -7019,17 +7027,17 @@
           </a:ln>
           <a:extLst>
             <a:ext uri="{FAA26D3D-D897-4be2-8F04-BA451C77F1D7}">
-              <ma14:placeholderFlag xmlns="" xmlns:ma14="http://schemas.microsoft.com/office/mac/drawingml/2011/main" val="1"/>
+              <ma14:placeholderFlag xmlns:ma14="http://schemas.microsoft.com/office/mac/drawingml/2011/main" xmlns="" val="1"/>
             </a:ext>
             <a:ext uri="{909E8E84-426E-40dd-AFC4-6F175D3DCCD1}">
-              <a14:hiddenFill xmlns="" xmlns:a14="http://schemas.microsoft.com/office/drawing/2010/main">
+              <a14:hiddenFill xmlns:a14="http://schemas.microsoft.com/office/drawing/2010/main" xmlns="">
                 <a:solidFill>
                   <a:srgbClr val="FFFFFF"/>
                 </a:solidFill>
               </a14:hiddenFill>
             </a:ext>
             <a:ext uri="{91240B29-F687-4f45-9708-019B960494DF}">
-              <a14:hiddenLine xmlns="" xmlns:a14="http://schemas.microsoft.com/office/drawing/2010/main" w="9525">
+              <a14:hiddenLine xmlns:a14="http://schemas.microsoft.com/office/drawing/2010/main" xmlns="" w="9525">
                 <a:solidFill>
                   <a:srgbClr val="000000"/>
                 </a:solidFill>
@@ -7287,7 +7295,7 @@
                 </a:solidFill>
                 <a:latin typeface="Calibri" charset="0"/>
               </a:rPr>
-              <a:t>Copyright © 2016 Oracle and/or its affiliates. All rights reserved.  |</a:t>
+              <a:t>Copyright © 2018 Oracle and/or its affiliates. All rights reserved.  |</a:t>
             </a:r>
           </a:p>
         </p:txBody>
@@ -8181,17 +8189,17 @@
           </a:ln>
           <a:extLst>
             <a:ext uri="{FAA26D3D-D897-4be2-8F04-BA451C77F1D7}">
-              <ma14:placeholderFlag xmlns="" xmlns:ma14="http://schemas.microsoft.com/office/mac/drawingml/2011/main" val="1"/>
+              <ma14:placeholderFlag xmlns:ma14="http://schemas.microsoft.com/office/mac/drawingml/2011/main" xmlns="" val="1"/>
             </a:ext>
             <a:ext uri="{909E8E84-426E-40dd-AFC4-6F175D3DCCD1}">
-              <a14:hiddenFill xmlns="" xmlns:a14="http://schemas.microsoft.com/office/drawing/2010/main">
+              <a14:hiddenFill xmlns:a14="http://schemas.microsoft.com/office/drawing/2010/main" xmlns="">
                 <a:solidFill>
                   <a:srgbClr val="FFFFFF"/>
                 </a:solidFill>
               </a14:hiddenFill>
             </a:ext>
             <a:ext uri="{91240B29-F687-4f45-9708-019B960494DF}">
-              <a14:hiddenLine xmlns="" xmlns:a14="http://schemas.microsoft.com/office/drawing/2010/main" w="9525">
+              <a14:hiddenLine xmlns:a14="http://schemas.microsoft.com/office/drawing/2010/main" xmlns="" w="9525">
                 <a:solidFill>
                   <a:srgbClr val="000000"/>
                 </a:solidFill>
@@ -8242,17 +8250,17 @@
           </a:ln>
           <a:extLst>
             <a:ext uri="{FAA26D3D-D897-4be2-8F04-BA451C77F1D7}">
-              <ma14:placeholderFlag xmlns="" xmlns:ma14="http://schemas.microsoft.com/office/mac/drawingml/2011/main" val="1"/>
+              <ma14:placeholderFlag xmlns:ma14="http://schemas.microsoft.com/office/mac/drawingml/2011/main" xmlns="" val="1"/>
             </a:ext>
             <a:ext uri="{909E8E84-426E-40dd-AFC4-6F175D3DCCD1}">
-              <a14:hiddenFill xmlns="" xmlns:a14="http://schemas.microsoft.com/office/drawing/2010/main">
+              <a14:hiddenFill xmlns:a14="http://schemas.microsoft.com/office/drawing/2010/main" xmlns="">
                 <a:solidFill>
                   <a:srgbClr val="FFFFFF"/>
                 </a:solidFill>
               </a14:hiddenFill>
             </a:ext>
             <a:ext uri="{91240B29-F687-4f45-9708-019B960494DF}">
-              <a14:hiddenLine xmlns="" xmlns:a14="http://schemas.microsoft.com/office/drawing/2010/main" w="9525">
+              <a14:hiddenLine xmlns:a14="http://schemas.microsoft.com/office/drawing/2010/main" xmlns="" w="9525">
                 <a:solidFill>
                   <a:srgbClr val="000000"/>
                 </a:solidFill>
@@ -8458,7 +8466,7 @@
                 </a:solidFill>
                 <a:latin typeface="Calibri" charset="0"/>
               </a:rPr>
-              <a:t>Copyright © 2017 Oracle and/or its affiliates. All rights reserved.  | Oracle Confidential.  Internal Use Only.</a:t>
+              <a:t>Copyright © 2018 Oracle and/or its affiliates. All rights reserved.  | Oracle Confidential.  Internal Use Only.</a:t>
             </a:r>
           </a:p>
         </p:txBody>
@@ -9704,7 +9712,7 @@
                   </a:srgbClr>
                 </a:solidFill>
               </a:rPr>
-              <a:t>Copyright © 2017 </a:t>
+              <a:t>Copyright © 2018 </a:t>
             </a:r>
             <a:r>
               <a:rPr sz="600" dirty="0">
@@ -9715,7 +9723,7 @@
                   </a:srgbClr>
                 </a:solidFill>
               </a:rPr>
-              <a:t>Oracle and/or its affiliates. All rights reserved.  |</a:t>
+              <a:t>Oracle and/or its affiliates. All rights reserved.  </a:t>
             </a:r>
           </a:p>
         </p:txBody>
@@ -10938,7 +10946,7 @@
                   </a:srgbClr>
                 </a:solidFill>
               </a:rPr>
-              <a:t>Copyright © 2017 </a:t>
+              <a:t>Copyright © 2018 </a:t>
             </a:r>
             <a:r>
               <a:rPr sz="600" dirty="0">
@@ -10949,7 +10957,7 @@
                   </a:srgbClr>
                 </a:solidFill>
               </a:rPr>
-              <a:t>Oracle and/or its affiliates. All rights reserved.  |</a:t>
+              <a:t>Oracle and/or its affiliates. All rights reserved.  </a:t>
             </a:r>
           </a:p>
         </p:txBody>
@@ -12668,7 +12676,7 @@
                   </a:srgbClr>
                 </a:solidFill>
               </a:rPr>
-              <a:t>Copyright © 2017 </a:t>
+              <a:t>Copyright © 2018 </a:t>
             </a:r>
             <a:r>
               <a:rPr sz="600" dirty="0">
@@ -12679,7 +12687,7 @@
                   </a:srgbClr>
                 </a:solidFill>
               </a:rPr>
-              <a:t>Oracle and/or its affiliates. All rights reserved.  |</a:t>
+              <a:t>Oracle and/or its affiliates. All rights reserved. </a:t>
             </a:r>
           </a:p>
         </p:txBody>
@@ -14404,7 +14412,7 @@
                   </a:srgbClr>
                 </a:solidFill>
               </a:rPr>
-              <a:t>Copyright © 2017 </a:t>
+              <a:t>Copyright © 2018 </a:t>
             </a:r>
             <a:r>
               <a:rPr sz="600" dirty="0">
@@ -14415,7 +14423,7 @@
                   </a:srgbClr>
                 </a:solidFill>
               </a:rPr>
-              <a:t>Oracle and/or its affiliates. All rights reserved.  |</a:t>
+              <a:t>Oracle and/or its affiliates. All rights reserved.  </a:t>
             </a:r>
           </a:p>
         </p:txBody>
@@ -16124,7 +16132,7 @@
                   </a:srgbClr>
                 </a:solidFill>
               </a:rPr>
-              <a:t>Copyright © 2017 </a:t>
+              <a:t>Copyright © 2018 </a:t>
             </a:r>
             <a:r>
               <a:rPr sz="600" dirty="0">
@@ -16135,7 +16143,7 @@
                   </a:srgbClr>
                 </a:solidFill>
               </a:rPr>
-              <a:t>Oracle and/or its affiliates. All rights reserved.  |</a:t>
+              <a:t>Oracle and/or its affiliates. All rights reserved.  </a:t>
             </a:r>
           </a:p>
         </p:txBody>

</xml_diff>